<commit_message>
ppt done + oral
</commit_message>
<xml_diff>
--- a/PPTOral.pptx
+++ b/PPTOral.pptx
@@ -5,10 +5,10 @@
     <p:sldMasterId id="2147483648" r:id="rId1"/>
   </p:sldMasterIdLst>
   <p:notesMasterIdLst>
-    <p:notesMasterId r:id="rId27"/>
+    <p:notesMasterId r:id="rId29"/>
   </p:notesMasterIdLst>
   <p:handoutMasterIdLst>
-    <p:handoutMasterId r:id="rId28"/>
+    <p:handoutMasterId r:id="rId30"/>
   </p:handoutMasterIdLst>
   <p:sldIdLst>
     <p:sldId id="257" r:id="rId2"/>
@@ -34,8 +34,10 @@
     <p:sldId id="324" r:id="rId22"/>
     <p:sldId id="325" r:id="rId23"/>
     <p:sldId id="326" r:id="rId24"/>
-    <p:sldId id="327" r:id="rId25"/>
-    <p:sldId id="328" r:id="rId26"/>
+    <p:sldId id="329" r:id="rId25"/>
+    <p:sldId id="327" r:id="rId26"/>
+    <p:sldId id="330" r:id="rId27"/>
+    <p:sldId id="328" r:id="rId28"/>
   </p:sldIdLst>
   <p:sldSz cx="9144000" cy="6858000" type="screen4x3"/>
   <p:notesSz cx="6669088" cy="9926638"/>
@@ -5112,24 +5114,7 @@
                 <a:ea typeface="+mn-ea"/>
                 <a:cs typeface="+mn-cs"/>
               </a:rPr>
-              <a:t>Framework Play(Java</a:t>
-            </a:r>
-            <a:r>
-              <a:rPr kumimoji="0" lang="fr-FR" sz="2400" b="1" i="0" u="none" strike="noStrike" kern="0" cap="none" spc="0" normalizeH="0" baseline="0" noProof="0" dirty="0" smtClean="0">
-                <a:ln>
-                  <a:noFill/>
-                </a:ln>
-                <a:solidFill>
-                  <a:srgbClr val="5F5F5F"/>
-                </a:solidFill>
-                <a:effectLst/>
-                <a:uLnTx/>
-                <a:uFillTx/>
-                <a:latin typeface="+mn-lt"/>
-                <a:ea typeface="+mn-ea"/>
-                <a:cs typeface="+mn-cs"/>
-              </a:rPr>
-              <a:t>)</a:t>
+              <a:t>Framework Play(Java)</a:t>
             </a:r>
           </a:p>
           <a:p>
@@ -5177,7 +5162,6 @@
               <a:rPr lang="fr-FR" sz="2000" b="1" kern="0" dirty="0" smtClean="0"/>
               <a:t>scala</a:t>
             </a:r>
-            <a:endParaRPr lang="fr-FR" sz="2000" b="1" kern="0" dirty="0" smtClean="0"/>
           </a:p>
           <a:p>
             <a:pPr marL="1143000" lvl="1" indent="-285750" algn="l" eaLnBrk="1" hangingPunct="1">
@@ -5203,7 +5187,6 @@
               <a:rPr lang="fr-FR" sz="2000" b="1" kern="0" dirty="0" smtClean="0"/>
               <a:t>REST</a:t>
             </a:r>
-            <a:endParaRPr lang="fr-FR" sz="2000" b="1" kern="0" dirty="0" smtClean="0"/>
           </a:p>
           <a:p>
             <a:pPr marL="571500" marR="0" lvl="0" indent="-342900" algn="l" defTabSz="914400" rtl="0" eaLnBrk="1" fontAlgn="base" latinLnBrk="0" hangingPunct="1">
@@ -5227,13 +5210,7 @@
               <a:rPr lang="fr-FR" sz="2400" b="1" kern="0" dirty="0" smtClean="0">
                 <a:latin typeface="+mn-lt"/>
               </a:rPr>
-              <a:t>Bases </a:t>
-            </a:r>
-            <a:r>
-              <a:rPr lang="fr-FR" sz="2400" b="1" kern="0" dirty="0" smtClean="0">
-                <a:latin typeface="+mn-lt"/>
-              </a:rPr>
-              <a:t>de données : </a:t>
+              <a:t>Bases de données : </a:t>
             </a:r>
             <a:r>
               <a:rPr lang="fr-FR" sz="2400" b="1" kern="0" dirty="0" err="1" smtClean="0">
@@ -15096,7 +15073,39 @@
           <a:bodyPr/>
           <a:lstStyle/>
           <a:p>
-            <a:endParaRPr lang="fr-FR" dirty="0"/>
+            <a:r>
+              <a:rPr lang="fr-FR" dirty="0" smtClean="0"/>
+              <a:t>Premiers tickets : Ajout de fonctionnalités sur le </a:t>
+            </a:r>
+            <a:r>
+              <a:rPr lang="fr-FR" dirty="0" err="1" smtClean="0"/>
+              <a:t>DataTable</a:t>
+            </a:r>
+            <a:r>
+              <a:rPr lang="fr-FR" dirty="0" smtClean="0"/>
+              <a:t> : </a:t>
+            </a:r>
+          </a:p>
+          <a:p>
+            <a:pPr lvl="1"/>
+            <a:r>
+              <a:rPr lang="fr-FR" dirty="0" smtClean="0"/>
+              <a:t>Liste des colonnes pouvant être groupées</a:t>
+            </a:r>
+          </a:p>
+          <a:p>
+            <a:pPr lvl="1"/>
+            <a:r>
+              <a:rPr lang="fr-FR" dirty="0" smtClean="0"/>
+              <a:t>Modifier l’export des données pour n’afficher que les groupes de données</a:t>
+            </a:r>
+          </a:p>
+          <a:p>
+            <a:pPr lvl="1"/>
+            <a:r>
+              <a:rPr lang="fr-FR" dirty="0" smtClean="0"/>
+              <a:t>Afficher de façon directe les éléments sélectionnés dans une liste déroulante</a:t>
+            </a:r>
           </a:p>
         </p:txBody>
       </p:sp>
@@ -15435,6 +15444,36 @@
           </a:p>
         </p:txBody>
       </p:sp>
+      <p:pic>
+        <p:nvPicPr>
+          <p:cNvPr id="5" name="Image 4"/>
+          <p:cNvPicPr>
+            <a:picLocks noChangeAspect="1"/>
+          </p:cNvPicPr>
+          <p:nvPr/>
+        </p:nvPicPr>
+        <p:blipFill>
+          <a:blip r:embed="rId3">
+            <a:extLst>
+              <a:ext uri="{28A0092B-C50C-407E-A947-70E740481C1C}">
+                <a14:useLocalDpi xmlns:a14="http://schemas.microsoft.com/office/drawing/2010/main" val="0"/>
+              </a:ext>
+            </a:extLst>
+          </a:blip>
+          <a:stretch>
+            <a:fillRect/>
+          </a:stretch>
+        </p:blipFill>
+        <p:spPr>
+          <a:xfrm>
+            <a:off x="1134356" y="3696488"/>
+            <a:ext cx="7956376" cy="2590875"/>
+          </a:xfrm>
+          <a:prstGeom prst="rect">
+            <a:avLst/>
+          </a:prstGeom>
+        </p:spPr>
+      </p:pic>
     </p:spTree>
     <p:extLst>
       <p:ext uri="{BB962C8B-B14F-4D97-AF65-F5344CB8AC3E}">
@@ -15510,6 +15549,18 @@
           <a:bodyPr/>
           <a:lstStyle/>
           <a:p>
+            <a:r>
+              <a:rPr lang="fr-FR" dirty="0" smtClean="0"/>
+              <a:t>Rajouter des </a:t>
+            </a:r>
+            <a:r>
+              <a:rPr lang="fr-FR" dirty="0" err="1" smtClean="0"/>
+              <a:t>stats</a:t>
+            </a:r>
+            <a:r>
+              <a:rPr lang="fr-FR" dirty="0" smtClean="0"/>
+              <a:t> préconfigurées pour certains projets</a:t>
+            </a:r>
             <a:endParaRPr lang="fr-FR" dirty="0"/>
           </a:p>
         </p:txBody>
@@ -15849,6 +15900,36 @@
           </a:p>
         </p:txBody>
       </p:sp>
+      <p:pic>
+        <p:nvPicPr>
+          <p:cNvPr id="13" name="Image 12"/>
+          <p:cNvPicPr>
+            <a:picLocks noChangeAspect="1"/>
+          </p:cNvPicPr>
+          <p:nvPr/>
+        </p:nvPicPr>
+        <p:blipFill>
+          <a:blip r:embed="rId3">
+            <a:extLst>
+              <a:ext uri="{28A0092B-C50C-407E-A947-70E740481C1C}">
+                <a14:useLocalDpi xmlns:a14="http://schemas.microsoft.com/office/drawing/2010/main" val="0"/>
+              </a:ext>
+            </a:extLst>
+          </a:blip>
+          <a:stretch>
+            <a:fillRect/>
+          </a:stretch>
+        </p:blipFill>
+        <p:spPr>
+          <a:xfrm>
+            <a:off x="1369498" y="2063469"/>
+            <a:ext cx="6948264" cy="4077261"/>
+          </a:xfrm>
+          <a:prstGeom prst="rect">
+            <a:avLst/>
+          </a:prstGeom>
+        </p:spPr>
+      </p:pic>
     </p:spTree>
     <p:extLst>
       <p:ext uri="{BB962C8B-B14F-4D97-AF65-F5344CB8AC3E}">
@@ -15902,10 +15983,9 @@
           <a:lstStyle/>
           <a:p>
             <a:r>
-              <a:rPr lang="fr-FR" dirty="0" smtClean="0"/>
-              <a:t>III – Le bilan de production</a:t>
-            </a:r>
-            <a:endParaRPr lang="fr-FR" dirty="0"/>
+              <a:rPr lang="fr-FR" dirty="0"/>
+              <a:t>II – Les statistiques préconfigurées</a:t>
+            </a:r>
           </a:p>
         </p:txBody>
       </p:sp>
@@ -15924,7 +16004,37 @@
           <a:bodyPr/>
           <a:lstStyle/>
           <a:p>
-            <a:endParaRPr lang="fr-FR"/>
+            <a:r>
+              <a:rPr lang="fr-FR" dirty="0" smtClean="0"/>
+              <a:t>Plusieurs étapes : </a:t>
+            </a:r>
+          </a:p>
+          <a:p>
+            <a:pPr lvl="1"/>
+            <a:r>
+              <a:rPr lang="fr-FR" dirty="0" smtClean="0"/>
+              <a:t>Créer le système d’insertion et de rapatriement des données</a:t>
+            </a:r>
+          </a:p>
+          <a:p>
+            <a:pPr lvl="1"/>
+            <a:r>
+              <a:rPr lang="fr-FR" dirty="0" smtClean="0"/>
+              <a:t>Insérer les pré-configurations dans la base </a:t>
+            </a:r>
+            <a:r>
+              <a:rPr lang="fr-FR" dirty="0" err="1" smtClean="0"/>
+              <a:t>MongoDB</a:t>
+            </a:r>
+            <a:endParaRPr lang="fr-FR" dirty="0" smtClean="0"/>
+          </a:p>
+          <a:p>
+            <a:pPr lvl="1"/>
+            <a:r>
+              <a:rPr lang="fr-FR" dirty="0" smtClean="0"/>
+              <a:t>Modifier le code existant pour permettre de générer les graphiques sans avoir besoin de passer par la configuration manuelle</a:t>
+            </a:r>
+            <a:endParaRPr lang="fr-FR" dirty="0"/>
           </a:p>
         </p:txBody>
       </p:sp>
@@ -15947,6 +16057,136 @@
               <a:rPr lang="fr-FR" smtClean="0"/>
               <a:pPr/>
               <a:t>24</a:t>
+            </a:fld>
+            <a:endParaRPr lang="fr-FR"/>
+          </a:p>
+        </p:txBody>
+      </p:sp>
+      <p:pic>
+        <p:nvPicPr>
+          <p:cNvPr id="5" name="Image 4"/>
+          <p:cNvPicPr>
+            <a:picLocks noChangeAspect="1"/>
+          </p:cNvPicPr>
+          <p:nvPr/>
+        </p:nvPicPr>
+        <p:blipFill>
+          <a:blip r:embed="rId2">
+            <a:extLst>
+              <a:ext uri="{28A0092B-C50C-407E-A947-70E740481C1C}">
+                <a14:useLocalDpi xmlns:a14="http://schemas.microsoft.com/office/drawing/2010/main" val="0"/>
+              </a:ext>
+            </a:extLst>
+          </a:blip>
+          <a:stretch>
+            <a:fillRect/>
+          </a:stretch>
+        </p:blipFill>
+        <p:spPr>
+          <a:xfrm>
+            <a:off x="1835696" y="4077072"/>
+            <a:ext cx="5648325" cy="1543050"/>
+          </a:xfrm>
+          <a:prstGeom prst="rect">
+            <a:avLst/>
+          </a:prstGeom>
+        </p:spPr>
+      </p:pic>
+    </p:spTree>
+    <p:extLst>
+      <p:ext uri="{BB962C8B-B14F-4D97-AF65-F5344CB8AC3E}">
+        <p14:creationId xmlns:p14="http://schemas.microsoft.com/office/powerpoint/2010/main" val="1354569744"/>
+      </p:ext>
+    </p:extLst>
+  </p:cSld>
+  <p:clrMapOvr>
+    <a:masterClrMapping/>
+  </p:clrMapOvr>
+</p:sld>
+</file>
+
+<file path=ppt/slides/slide25.xml><?xml version="1.0" encoding="utf-8"?>
+<p:sld xmlns:a="http://schemas.openxmlformats.org/drawingml/2006/main" xmlns:r="http://schemas.openxmlformats.org/officeDocument/2006/relationships" xmlns:p="http://schemas.openxmlformats.org/presentationml/2006/main">
+  <p:cSld>
+    <p:spTree>
+      <p:nvGrpSpPr>
+        <p:cNvPr id="1" name=""/>
+        <p:cNvGrpSpPr/>
+        <p:nvPr/>
+      </p:nvGrpSpPr>
+      <p:grpSpPr>
+        <a:xfrm>
+          <a:off x="0" y="0"/>
+          <a:ext cx="0" cy="0"/>
+          <a:chOff x="0" y="0"/>
+          <a:chExt cx="0" cy="0"/>
+        </a:xfrm>
+      </p:grpSpPr>
+      <p:sp>
+        <p:nvSpPr>
+          <p:cNvPr id="2" name="Titre 1"/>
+          <p:cNvSpPr>
+            <a:spLocks noGrp="1"/>
+          </p:cNvSpPr>
+          <p:nvPr>
+            <p:ph type="title"/>
+          </p:nvPr>
+        </p:nvSpPr>
+        <p:spPr/>
+        <p:txBody>
+          <a:bodyPr/>
+          <a:lstStyle/>
+          <a:p>
+            <a:r>
+              <a:rPr lang="fr-FR" dirty="0" smtClean="0"/>
+              <a:t>III – Le bilan de production</a:t>
+            </a:r>
+            <a:endParaRPr lang="fr-FR" dirty="0"/>
+          </a:p>
+        </p:txBody>
+      </p:sp>
+      <p:sp>
+        <p:nvSpPr>
+          <p:cNvPr id="3" name="Espace réservé du contenu 2"/>
+          <p:cNvSpPr>
+            <a:spLocks noGrp="1"/>
+          </p:cNvSpPr>
+          <p:nvPr>
+            <p:ph idx="1"/>
+          </p:nvPr>
+        </p:nvSpPr>
+        <p:spPr/>
+        <p:txBody>
+          <a:bodyPr/>
+          <a:lstStyle/>
+          <a:p>
+            <a:r>
+              <a:rPr lang="fr-FR" dirty="0" smtClean="0"/>
+              <a:t>Construction complète d’une page permettant d’afficher, par année, les statistiques concernant le nombre de bases ADN générées par le séquençage</a:t>
+            </a:r>
+            <a:endParaRPr lang="fr-FR" dirty="0"/>
+          </a:p>
+        </p:txBody>
+      </p:sp>
+      <p:sp>
+        <p:nvSpPr>
+          <p:cNvPr id="4" name="Espace réservé du numéro de diapositive 3"/>
+          <p:cNvSpPr>
+            <a:spLocks noGrp="1"/>
+          </p:cNvSpPr>
+          <p:nvPr>
+            <p:ph type="sldNum" sz="quarter" idx="10"/>
+          </p:nvPr>
+        </p:nvSpPr>
+        <p:spPr/>
+        <p:txBody>
+          <a:bodyPr/>
+          <a:lstStyle/>
+          <a:p>
+            <a:fld id="{228977EE-2505-4E01-83E6-F24DDA98A02D}" type="slidenum">
+              <a:rPr lang="fr-FR" smtClean="0"/>
+              <a:pPr/>
+              <a:t>25</a:t>
             </a:fld>
             <a:endParaRPr lang="fr-FR"/>
           </a:p>
@@ -16263,6 +16503,36 @@
           </a:p>
         </p:txBody>
       </p:sp>
+      <p:pic>
+        <p:nvPicPr>
+          <p:cNvPr id="12" name="Image 11"/>
+          <p:cNvPicPr>
+            <a:picLocks noChangeAspect="1"/>
+          </p:cNvPicPr>
+          <p:nvPr/>
+        </p:nvPicPr>
+        <p:blipFill>
+          <a:blip r:embed="rId3" cstate="print">
+            <a:extLst>
+              <a:ext uri="{28A0092B-C50C-407E-A947-70E740481C1C}">
+                <a14:useLocalDpi xmlns:a14="http://schemas.microsoft.com/office/drawing/2010/main" val="0"/>
+              </a:ext>
+            </a:extLst>
+          </a:blip>
+          <a:stretch>
+            <a:fillRect/>
+          </a:stretch>
+        </p:blipFill>
+        <p:spPr>
+          <a:xfrm>
+            <a:off x="2483768" y="2868713"/>
+            <a:ext cx="4572000" cy="3251835"/>
+          </a:xfrm>
+          <a:prstGeom prst="rect">
+            <a:avLst/>
+          </a:prstGeom>
+        </p:spPr>
+      </p:pic>
     </p:spTree>
     <p:extLst>
       <p:ext uri="{BB962C8B-B14F-4D97-AF65-F5344CB8AC3E}">
@@ -16283,7 +16553,7 @@
 </p:sld>
 </file>
 
-<file path=ppt/slides/slide25.xml><?xml version="1.0" encoding="utf-8"?>
+<file path=ppt/slides/slide26.xml><?xml version="1.0" encoding="utf-8"?>
 <p:sld xmlns:a="http://schemas.openxmlformats.org/drawingml/2006/main" xmlns:r="http://schemas.openxmlformats.org/officeDocument/2006/relationships" xmlns:p="http://schemas.openxmlformats.org/presentationml/2006/main">
   <p:cSld>
     <p:spTree>
@@ -16310,19 +16580,72 @@
             <p:ph type="title"/>
           </p:nvPr>
         </p:nvSpPr>
-        <p:spPr>
-          <a:xfrm>
-            <a:off x="2627784" y="2000240"/>
-            <a:ext cx="5688632" cy="1362075"/>
-          </a:xfrm>
-        </p:spPr>
+        <p:spPr/>
         <p:txBody>
           <a:bodyPr/>
           <a:lstStyle/>
           <a:p>
             <a:r>
               <a:rPr lang="fr-FR" dirty="0" smtClean="0"/>
-              <a:t>Conclusion</a:t>
+              <a:t>III – Le bilan de production</a:t>
+            </a:r>
+            <a:endParaRPr lang="fr-FR" dirty="0"/>
+          </a:p>
+        </p:txBody>
+      </p:sp>
+      <p:sp>
+        <p:nvSpPr>
+          <p:cNvPr id="3" name="Espace réservé du contenu 2"/>
+          <p:cNvSpPr>
+            <a:spLocks noGrp="1"/>
+          </p:cNvSpPr>
+          <p:nvPr>
+            <p:ph idx="1"/>
+          </p:nvPr>
+        </p:nvSpPr>
+        <p:spPr/>
+        <p:txBody>
+          <a:bodyPr/>
+          <a:lstStyle/>
+          <a:p>
+            <a:r>
+              <a:rPr lang="fr-FR" dirty="0" smtClean="0"/>
+              <a:t>Utilisation complète des systèmes utilisés dans NGL (Client, Serveur, Bases de données)</a:t>
+            </a:r>
+          </a:p>
+          <a:p>
+            <a:pPr lvl="1"/>
+            <a:r>
+              <a:rPr lang="fr-FR" dirty="0" smtClean="0"/>
+              <a:t>Création de ma page avec les routes y accédant</a:t>
+            </a:r>
+          </a:p>
+          <a:p>
+            <a:pPr lvl="1"/>
+            <a:r>
+              <a:rPr lang="fr-FR" dirty="0" smtClean="0"/>
+              <a:t>Gestion du design de la page</a:t>
+            </a:r>
+          </a:p>
+          <a:p>
+            <a:pPr lvl="1"/>
+            <a:r>
+              <a:rPr lang="fr-FR" dirty="0" smtClean="0"/>
+              <a:t>Récupération des données</a:t>
+            </a:r>
+          </a:p>
+          <a:p>
+            <a:pPr lvl="1"/>
+            <a:r>
+              <a:rPr lang="fr-FR" dirty="0" smtClean="0"/>
+              <a:t>Traitement des données pour chaque bilan</a:t>
+            </a:r>
+          </a:p>
+          <a:p>
+            <a:pPr lvl="1"/>
+            <a:r>
+              <a:rPr lang="fr-FR" dirty="0" smtClean="0"/>
+              <a:t>Amélioration des performances via la mise en cache</a:t>
             </a:r>
             <a:endParaRPr lang="fr-FR" dirty="0"/>
           </a:p>
@@ -16343,10 +16666,569 @@
           <a:bodyPr/>
           <a:lstStyle/>
           <a:p>
+            <a:fld id="{228977EE-2505-4E01-83E6-F24DDA98A02D}" type="slidenum">
+              <a:rPr lang="fr-FR" smtClean="0"/>
+              <a:pPr/>
+              <a:t>26</a:t>
+            </a:fld>
+            <a:endParaRPr lang="fr-FR"/>
+          </a:p>
+        </p:txBody>
+      </p:sp>
+      <p:sp>
+        <p:nvSpPr>
+          <p:cNvPr id="6" name="Espace réservé du numéro de diapositive 3"/>
+          <p:cNvSpPr txBox="1">
+            <a:spLocks/>
+          </p:cNvSpPr>
+          <p:nvPr/>
+        </p:nvSpPr>
+        <p:spPr bwMode="auto">
+          <a:xfrm>
+            <a:off x="8277225" y="6477000"/>
+            <a:ext cx="719138" cy="323850"/>
+          </a:xfrm>
+          <a:prstGeom prst="rect">
+            <a:avLst/>
+          </a:prstGeom>
+          <a:noFill/>
+          <a:ln w="9525">
+            <a:noFill/>
+            <a:miter lim="800000"/>
+            <a:headEnd/>
+            <a:tailEnd/>
+          </a:ln>
+          <a:effectLst/>
+        </p:spPr>
+        <p:txBody>
+          <a:bodyPr vert="horz" wrap="square" lIns="91440" tIns="45720" rIns="91440" bIns="45720" numCol="1" anchor="t" anchorCtr="0" compatLnSpc="1">
+            <a:prstTxWarp prst="textNoShape">
+              <a:avLst/>
+            </a:prstTxWarp>
+          </a:bodyPr>
+          <a:lstStyle>
+            <a:defPPr>
+              <a:defRPr lang="fr-FR"/>
+            </a:defPPr>
+            <a:lvl1pPr algn="r" rtl="0" eaLnBrk="0" fontAlgn="base" hangingPunct="0">
+              <a:spcBef>
+                <a:spcPct val="0"/>
+              </a:spcBef>
+              <a:spcAft>
+                <a:spcPct val="0"/>
+              </a:spcAft>
+              <a:defRPr sz="1200" kern="1200">
+                <a:solidFill>
+                  <a:srgbClr val="5F5F5F"/>
+                </a:solidFill>
+                <a:latin typeface="Arial" charset="0"/>
+                <a:ea typeface="+mn-ea"/>
+                <a:cs typeface="+mn-cs"/>
+              </a:defRPr>
+            </a:lvl1pPr>
+            <a:lvl2pPr marL="457200" algn="ctr" rtl="0" eaLnBrk="0" fontAlgn="base" hangingPunct="0">
+              <a:spcBef>
+                <a:spcPct val="0"/>
+              </a:spcBef>
+              <a:spcAft>
+                <a:spcPct val="0"/>
+              </a:spcAft>
+              <a:defRPr sz="1400" kern="1200">
+                <a:solidFill>
+                  <a:srgbClr val="5F5F5F"/>
+                </a:solidFill>
+                <a:latin typeface="Arial" charset="0"/>
+                <a:ea typeface="+mn-ea"/>
+                <a:cs typeface="+mn-cs"/>
+              </a:defRPr>
+            </a:lvl2pPr>
+            <a:lvl3pPr marL="914400" algn="ctr" rtl="0" eaLnBrk="0" fontAlgn="base" hangingPunct="0">
+              <a:spcBef>
+                <a:spcPct val="0"/>
+              </a:spcBef>
+              <a:spcAft>
+                <a:spcPct val="0"/>
+              </a:spcAft>
+              <a:defRPr sz="1400" kern="1200">
+                <a:solidFill>
+                  <a:srgbClr val="5F5F5F"/>
+                </a:solidFill>
+                <a:latin typeface="Arial" charset="0"/>
+                <a:ea typeface="+mn-ea"/>
+                <a:cs typeface="+mn-cs"/>
+              </a:defRPr>
+            </a:lvl3pPr>
+            <a:lvl4pPr marL="1371600" algn="ctr" rtl="0" eaLnBrk="0" fontAlgn="base" hangingPunct="0">
+              <a:spcBef>
+                <a:spcPct val="0"/>
+              </a:spcBef>
+              <a:spcAft>
+                <a:spcPct val="0"/>
+              </a:spcAft>
+              <a:defRPr sz="1400" kern="1200">
+                <a:solidFill>
+                  <a:srgbClr val="5F5F5F"/>
+                </a:solidFill>
+                <a:latin typeface="Arial" charset="0"/>
+                <a:ea typeface="+mn-ea"/>
+                <a:cs typeface="+mn-cs"/>
+              </a:defRPr>
+            </a:lvl4pPr>
+            <a:lvl5pPr marL="1828800" algn="ctr" rtl="0" eaLnBrk="0" fontAlgn="base" hangingPunct="0">
+              <a:spcBef>
+                <a:spcPct val="0"/>
+              </a:spcBef>
+              <a:spcAft>
+                <a:spcPct val="0"/>
+              </a:spcAft>
+              <a:defRPr sz="1400" kern="1200">
+                <a:solidFill>
+                  <a:srgbClr val="5F5F5F"/>
+                </a:solidFill>
+                <a:latin typeface="Arial" charset="0"/>
+                <a:ea typeface="+mn-ea"/>
+                <a:cs typeface="+mn-cs"/>
+              </a:defRPr>
+            </a:lvl5pPr>
+            <a:lvl6pPr marL="2286000" algn="l" defTabSz="914400" rtl="0" eaLnBrk="1" latinLnBrk="0" hangingPunct="1">
+              <a:defRPr sz="1400" kern="1200">
+                <a:solidFill>
+                  <a:srgbClr val="5F5F5F"/>
+                </a:solidFill>
+                <a:latin typeface="Arial" charset="0"/>
+                <a:ea typeface="+mn-ea"/>
+                <a:cs typeface="+mn-cs"/>
+              </a:defRPr>
+            </a:lvl6pPr>
+            <a:lvl7pPr marL="2743200" algn="l" defTabSz="914400" rtl="0" eaLnBrk="1" latinLnBrk="0" hangingPunct="1">
+              <a:defRPr sz="1400" kern="1200">
+                <a:solidFill>
+                  <a:srgbClr val="5F5F5F"/>
+                </a:solidFill>
+                <a:latin typeface="Arial" charset="0"/>
+                <a:ea typeface="+mn-ea"/>
+                <a:cs typeface="+mn-cs"/>
+              </a:defRPr>
+            </a:lvl7pPr>
+            <a:lvl8pPr marL="3200400" algn="l" defTabSz="914400" rtl="0" eaLnBrk="1" latinLnBrk="0" hangingPunct="1">
+              <a:defRPr sz="1400" kern="1200">
+                <a:solidFill>
+                  <a:srgbClr val="5F5F5F"/>
+                </a:solidFill>
+                <a:latin typeface="Arial" charset="0"/>
+                <a:ea typeface="+mn-ea"/>
+                <a:cs typeface="+mn-cs"/>
+              </a:defRPr>
+            </a:lvl8pPr>
+            <a:lvl9pPr marL="3657600" algn="l" defTabSz="914400" rtl="0" eaLnBrk="1" latinLnBrk="0" hangingPunct="1">
+              <a:defRPr sz="1400" kern="1200">
+                <a:solidFill>
+                  <a:srgbClr val="5F5F5F"/>
+                </a:solidFill>
+                <a:latin typeface="Arial" charset="0"/>
+                <a:ea typeface="+mn-ea"/>
+                <a:cs typeface="+mn-cs"/>
+              </a:defRPr>
+            </a:lvl9pPr>
+          </a:lstStyle>
+          <a:p>
             <a:fld id="{FF0D4E12-90AB-43C7-A8D7-C81DF0B3B942}" type="slidenum">
               <a:rPr lang="fr-FR" smtClean="0"/>
               <a:pPr/>
-              <a:t>25</a:t>
+              <a:t>26</a:t>
+            </a:fld>
+            <a:endParaRPr lang="fr-FR" dirty="0"/>
+          </a:p>
+        </p:txBody>
+      </p:sp>
+      <p:sp>
+        <p:nvSpPr>
+          <p:cNvPr id="7" name="Rectangle 2"/>
+          <p:cNvSpPr txBox="1">
+            <a:spLocks noChangeArrowheads="1"/>
+          </p:cNvSpPr>
+          <p:nvPr/>
+        </p:nvSpPr>
+        <p:spPr>
+          <a:xfrm>
+            <a:off x="8277225" y="6477000"/>
+            <a:ext cx="719138" cy="323850"/>
+          </a:xfrm>
+          <a:prstGeom prst="rect">
+            <a:avLst/>
+          </a:prstGeom>
+        </p:spPr>
+        <p:txBody>
+          <a:bodyPr/>
+          <a:lstStyle/>
+          <a:p>
+            <a:pPr marL="0" marR="0" lvl="0" indent="0" algn="ctr" defTabSz="914400" rtl="0" eaLnBrk="0" fontAlgn="base" latinLnBrk="0" hangingPunct="0">
+              <a:lnSpc>
+                <a:spcPct val="100000"/>
+              </a:lnSpc>
+              <a:spcBef>
+                <a:spcPct val="0"/>
+              </a:spcBef>
+              <a:spcAft>
+                <a:spcPct val="0"/>
+              </a:spcAft>
+              <a:buClrTx/>
+              <a:buSzTx/>
+              <a:buFontTx/>
+              <a:buNone/>
+              <a:tabLst/>
+              <a:defRPr/>
+            </a:pPr>
+            <a:endParaRPr kumimoji="0" lang="fr-FR" sz="1400" b="0" i="0" u="none" strike="noStrike" kern="1200" cap="none" spc="0" normalizeH="0" baseline="0" noProof="0" dirty="0" smtClean="0">
+              <a:ln>
+                <a:noFill/>
+              </a:ln>
+              <a:solidFill>
+                <a:srgbClr val="5F5F5F"/>
+              </a:solidFill>
+              <a:effectLst/>
+              <a:uLnTx/>
+              <a:uFillTx/>
+              <a:latin typeface="Arial" charset="0"/>
+              <a:ea typeface="+mn-ea"/>
+              <a:cs typeface="+mn-cs"/>
+            </a:endParaRPr>
+          </a:p>
+        </p:txBody>
+      </p:sp>
+      <p:sp>
+        <p:nvSpPr>
+          <p:cNvPr id="8" name="Rectangle 5"/>
+          <p:cNvSpPr txBox="1">
+            <a:spLocks noChangeArrowheads="1"/>
+          </p:cNvSpPr>
+          <p:nvPr/>
+        </p:nvSpPr>
+        <p:spPr>
+          <a:xfrm>
+            <a:off x="1331913" y="765175"/>
+            <a:ext cx="7561262" cy="1150938"/>
+          </a:xfrm>
+          <a:prstGeom prst="rect">
+            <a:avLst/>
+          </a:prstGeom>
+        </p:spPr>
+        <p:txBody>
+          <a:bodyPr/>
+          <a:lstStyle/>
+          <a:p>
+            <a:pPr marL="0" marR="0" lvl="0" indent="0" algn="l" defTabSz="914400" rtl="0" eaLnBrk="1" fontAlgn="base" latinLnBrk="0" hangingPunct="1">
+              <a:lnSpc>
+                <a:spcPct val="100000"/>
+              </a:lnSpc>
+              <a:spcBef>
+                <a:spcPct val="0"/>
+              </a:spcBef>
+              <a:spcAft>
+                <a:spcPct val="0"/>
+              </a:spcAft>
+              <a:buClrTx/>
+              <a:buSzTx/>
+              <a:buFontTx/>
+              <a:buNone/>
+              <a:tabLst/>
+              <a:defRPr/>
+            </a:pPr>
+            <a:r>
+              <a:rPr kumimoji="0" lang="fr-FR" sz="2400" b="1" i="0" u="none" strike="noStrike" kern="0" cap="none" spc="0" normalizeH="0" baseline="0" noProof="0" smtClean="0">
+                <a:ln>
+                  <a:noFill/>
+                </a:ln>
+                <a:solidFill>
+                  <a:srgbClr val="5F5F5F"/>
+                </a:solidFill>
+                <a:effectLst/>
+                <a:uLnTx/>
+                <a:uFillTx/>
+                <a:latin typeface="+mj-lt"/>
+                <a:ea typeface="+mj-ea"/>
+                <a:cs typeface="+mj-cs"/>
+              </a:rPr>
+              <a:t> </a:t>
+            </a:r>
+          </a:p>
+        </p:txBody>
+      </p:sp>
+      <p:sp>
+        <p:nvSpPr>
+          <p:cNvPr id="9" name="Rectangle 6"/>
+          <p:cNvSpPr txBox="1">
+            <a:spLocks noChangeArrowheads="1"/>
+          </p:cNvSpPr>
+          <p:nvPr/>
+        </p:nvSpPr>
+        <p:spPr>
+          <a:xfrm>
+            <a:off x="1371600" y="1412875"/>
+            <a:ext cx="7448550" cy="3217863"/>
+          </a:xfrm>
+          <a:prstGeom prst="rect">
+            <a:avLst/>
+          </a:prstGeom>
+        </p:spPr>
+        <p:txBody>
+          <a:bodyPr/>
+          <a:lstStyle/>
+          <a:p>
+            <a:pPr marL="571500" marR="0" lvl="0" indent="-342900" algn="l" defTabSz="914400" rtl="0" eaLnBrk="1" fontAlgn="base" latinLnBrk="0" hangingPunct="1">
+              <a:lnSpc>
+                <a:spcPct val="80000"/>
+              </a:lnSpc>
+              <a:spcBef>
+                <a:spcPct val="20000"/>
+              </a:spcBef>
+              <a:spcAft>
+                <a:spcPct val="0"/>
+              </a:spcAft>
+              <a:buClrTx/>
+              <a:buSzTx/>
+              <a:buFont typeface="Wingdings" pitchFamily="2" charset="2"/>
+              <a:buChar char="q"/>
+              <a:tabLst/>
+              <a:defRPr/>
+            </a:pPr>
+            <a:endParaRPr kumimoji="0" lang="fr-FR" sz="2000" b="0" i="1" u="none" strike="noStrike" kern="0" cap="none" spc="0" normalizeH="0" baseline="0" noProof="0" dirty="0" smtClean="0">
+              <a:ln>
+                <a:noFill/>
+              </a:ln>
+              <a:solidFill>
+                <a:schemeClr val="folHlink"/>
+              </a:solidFill>
+              <a:effectLst/>
+              <a:uLnTx/>
+              <a:uFillTx/>
+              <a:latin typeface="+mn-lt"/>
+              <a:ea typeface="+mn-ea"/>
+              <a:cs typeface="+mn-cs"/>
+            </a:endParaRPr>
+          </a:p>
+        </p:txBody>
+      </p:sp>
+      <p:pic>
+        <p:nvPicPr>
+          <p:cNvPr id="10" name="Image 9" descr="Genoscope-CNS.gif"/>
+          <p:cNvPicPr>
+            <a:picLocks noChangeAspect="1"/>
+          </p:cNvPicPr>
+          <p:nvPr/>
+        </p:nvPicPr>
+        <p:blipFill>
+          <a:blip r:embed="rId2"/>
+          <a:stretch>
+            <a:fillRect/>
+          </a:stretch>
+        </p:blipFill>
+        <p:spPr>
+          <a:xfrm>
+            <a:off x="214282" y="2000240"/>
+            <a:ext cx="821537" cy="714380"/>
+          </a:xfrm>
+          <a:prstGeom prst="rect">
+            <a:avLst/>
+          </a:prstGeom>
+        </p:spPr>
+      </p:pic>
+      <p:sp>
+        <p:nvSpPr>
+          <p:cNvPr id="11" name="Rectangle 10"/>
+          <p:cNvSpPr/>
+          <p:nvPr/>
+        </p:nvSpPr>
+        <p:spPr bwMode="auto">
+          <a:xfrm>
+            <a:off x="1214414" y="6500834"/>
+            <a:ext cx="2357454" cy="357166"/>
+          </a:xfrm>
+          <a:prstGeom prst="rect">
+            <a:avLst/>
+          </a:prstGeom>
+          <a:noFill/>
+          <a:ln w="9525" cap="flat" cmpd="sng" algn="ctr">
+            <a:noFill/>
+            <a:prstDash val="solid"/>
+            <a:round/>
+            <a:headEnd type="none" w="med" len="med"/>
+            <a:tailEnd type="none" w="med" len="med"/>
+          </a:ln>
+          <a:effectLst/>
+        </p:spPr>
+        <p:txBody>
+          <a:bodyPr vert="horz" wrap="square" lIns="91440" tIns="45720" rIns="91440" bIns="45720" numCol="1" rtlCol="0" anchor="t" anchorCtr="0" compatLnSpc="1">
+            <a:prstTxWarp prst="textNoShape">
+              <a:avLst/>
+            </a:prstTxWarp>
+          </a:bodyPr>
+          <a:lstStyle/>
+          <a:p>
+            <a:pPr marL="0" marR="0" indent="0" algn="ctr" defTabSz="914400" rtl="0" eaLnBrk="0" fontAlgn="base" latinLnBrk="0" hangingPunct="0">
+              <a:lnSpc>
+                <a:spcPct val="100000"/>
+              </a:lnSpc>
+              <a:spcBef>
+                <a:spcPct val="0"/>
+              </a:spcBef>
+              <a:spcAft>
+                <a:spcPct val="0"/>
+              </a:spcAft>
+              <a:buClrTx/>
+              <a:buSzTx/>
+              <a:buFontTx/>
+              <a:buNone/>
+              <a:tabLst/>
+            </a:pPr>
+            <a:endParaRPr kumimoji="0" lang="fr-FR" sz="1400" b="0" i="0" u="none" strike="noStrike" cap="none" normalizeH="0" baseline="0" smtClean="0">
+              <a:ln>
+                <a:noFill/>
+              </a:ln>
+              <a:solidFill>
+                <a:srgbClr val="5F5F5F"/>
+              </a:solidFill>
+              <a:effectLst/>
+              <a:latin typeface="Arial" charset="0"/>
+            </a:endParaRPr>
+          </a:p>
+        </p:txBody>
+      </p:sp>
+      <p:sp>
+        <p:nvSpPr>
+          <p:cNvPr id="12" name="ZoneTexte 11"/>
+          <p:cNvSpPr txBox="1"/>
+          <p:nvPr/>
+        </p:nvSpPr>
+        <p:spPr>
+          <a:xfrm>
+            <a:off x="1285852" y="6550223"/>
+            <a:ext cx="2071701" cy="307777"/>
+          </a:xfrm>
+          <a:prstGeom prst="rect">
+            <a:avLst/>
+          </a:prstGeom>
+          <a:solidFill>
+            <a:schemeClr val="bg1"/>
+          </a:solidFill>
+        </p:spPr>
+        <p:txBody>
+          <a:bodyPr wrap="square" rtlCol="0">
+            <a:spAutoFit/>
+          </a:bodyPr>
+          <a:lstStyle/>
+          <a:p>
+            <a:endParaRPr lang="fr-FR" dirty="0"/>
+          </a:p>
+        </p:txBody>
+      </p:sp>
+      <p:sp>
+        <p:nvSpPr>
+          <p:cNvPr id="13" name="ZoneTexte 12"/>
+          <p:cNvSpPr txBox="1"/>
+          <p:nvPr/>
+        </p:nvSpPr>
+        <p:spPr>
+          <a:xfrm>
+            <a:off x="1000100" y="6478809"/>
+            <a:ext cx="2571768" cy="307777"/>
+          </a:xfrm>
+          <a:prstGeom prst="rect">
+            <a:avLst/>
+          </a:prstGeom>
+          <a:noFill/>
+        </p:spPr>
+        <p:txBody>
+          <a:bodyPr wrap="square" rtlCol="0">
+            <a:spAutoFit/>
+          </a:bodyPr>
+          <a:lstStyle/>
+          <a:p>
+            <a:r>
+              <a:rPr lang="fr-FR" dirty="0" smtClean="0"/>
+              <a:t>Genoscope / CEA - FAR</a:t>
+            </a:r>
+            <a:endParaRPr lang="fr-FR" dirty="0"/>
+          </a:p>
+        </p:txBody>
+      </p:sp>
+    </p:spTree>
+    <p:extLst>
+      <p:ext uri="{BB962C8B-B14F-4D97-AF65-F5344CB8AC3E}">
+        <p14:creationId xmlns:p14="http://schemas.microsoft.com/office/powerpoint/2010/main" val="1591630269"/>
+      </p:ext>
+    </p:extLst>
+  </p:cSld>
+  <p:clrMapOvr>
+    <a:masterClrMapping/>
+  </p:clrMapOvr>
+</p:sld>
+</file>
+
+<file path=ppt/slides/slide27.xml><?xml version="1.0" encoding="utf-8"?>
+<p:sld xmlns:a="http://schemas.openxmlformats.org/drawingml/2006/main" xmlns:r="http://schemas.openxmlformats.org/officeDocument/2006/relationships" xmlns:p="http://schemas.openxmlformats.org/presentationml/2006/main">
+  <p:cSld>
+    <p:spTree>
+      <p:nvGrpSpPr>
+        <p:cNvPr id="1" name=""/>
+        <p:cNvGrpSpPr/>
+        <p:nvPr/>
+      </p:nvGrpSpPr>
+      <p:grpSpPr>
+        <a:xfrm>
+          <a:off x="0" y="0"/>
+          <a:ext cx="0" cy="0"/>
+          <a:chOff x="0" y="0"/>
+          <a:chExt cx="0" cy="0"/>
+        </a:xfrm>
+      </p:grpSpPr>
+      <p:sp>
+        <p:nvSpPr>
+          <p:cNvPr id="2" name="Titre 1"/>
+          <p:cNvSpPr>
+            <a:spLocks noGrp="1"/>
+          </p:cNvSpPr>
+          <p:nvPr>
+            <p:ph type="title"/>
+          </p:nvPr>
+        </p:nvSpPr>
+        <p:spPr>
+          <a:xfrm>
+            <a:off x="2627784" y="2000240"/>
+            <a:ext cx="5688632" cy="1362075"/>
+          </a:xfrm>
+        </p:spPr>
+        <p:txBody>
+          <a:bodyPr/>
+          <a:lstStyle/>
+          <a:p>
+            <a:r>
+              <a:rPr lang="fr-FR" dirty="0" smtClean="0"/>
+              <a:t>Conclusion</a:t>
+            </a:r>
+            <a:endParaRPr lang="fr-FR" dirty="0"/>
+          </a:p>
+        </p:txBody>
+      </p:sp>
+      <p:sp>
+        <p:nvSpPr>
+          <p:cNvPr id="4" name="Espace réservé du numéro de diapositive 3"/>
+          <p:cNvSpPr>
+            <a:spLocks noGrp="1"/>
+          </p:cNvSpPr>
+          <p:nvPr>
+            <p:ph type="sldNum" sz="quarter" idx="10"/>
+          </p:nvPr>
+        </p:nvSpPr>
+        <p:spPr/>
+        <p:txBody>
+          <a:bodyPr/>
+          <a:lstStyle/>
+          <a:p>
+            <a:fld id="{FF0D4E12-90AB-43C7-A8D7-C81DF0B3B942}" type="slidenum">
+              <a:rPr lang="fr-FR" smtClean="0"/>
+              <a:pPr/>
+              <a:t>27</a:t>
             </a:fld>
             <a:endParaRPr lang="fr-FR" dirty="0"/>
           </a:p>
@@ -18577,23 +19459,22 @@
             </a:r>
             <a:r>
               <a:rPr lang="fr-FR" sz="1800" dirty="0" err="1" smtClean="0"/>
-              <a:t>two</a:t>
-            </a:r>
-            <a:r>
-              <a:rPr lang="fr-FR" sz="1800" dirty="0" smtClean="0"/>
-              <a:t>-</a:t>
-            </a:r>
-            <a:r>
-              <a:rPr lang="fr-FR" sz="1800" dirty="0" err="1" smtClean="0"/>
-              <a:t>way</a:t>
+              <a:t>two-way</a:t>
             </a:r>
             <a:r>
               <a:rPr lang="fr-FR" sz="1800" dirty="0" smtClean="0"/>
               <a:t> data </a:t>
             </a:r>
             <a:r>
-              <a:rPr lang="fr-FR" sz="1800" dirty="0" err="1" smtClean="0"/>
+              <a:rPr lang="fr-FR" sz="1800" dirty="0" smtClean="0"/>
               <a:t>binding</a:t>
+            </a:r>
+          </a:p>
+          <a:p>
+            <a:pPr lvl="1"/>
+            <a:r>
+              <a:rPr lang="fr-FR" sz="1800" dirty="0" smtClean="0"/>
+              <a:t>Permet de rajouter des balises HTML via des directives</a:t>
             </a:r>
             <a:endParaRPr lang="fr-FR" sz="1800" dirty="0" smtClean="0"/>
           </a:p>
@@ -18608,22 +19489,11 @@
             <a:pPr lvl="1"/>
             <a:r>
               <a:rPr lang="fr-FR" sz="1800" dirty="0" smtClean="0"/>
-              <a:t>Permet de créer un </a:t>
-            </a:r>
-            <a:r>
-              <a:rPr lang="fr-FR" sz="1800" dirty="0" err="1" smtClean="0"/>
-              <a:t>DataTable</a:t>
+              <a:t>Aujourd’hui</a:t>
             </a:r>
             <a:r>
               <a:rPr lang="fr-FR" sz="1800" dirty="0" smtClean="0"/>
-              <a:t> supportant l’édition de masse ainsi que d’autres fonctions</a:t>
-            </a:r>
-          </a:p>
-          <a:p>
-            <a:pPr lvl="1"/>
-            <a:r>
-              <a:rPr lang="fr-FR" sz="1800" dirty="0" smtClean="0"/>
-              <a:t>Aujourd’hui, le choix ne serait peut-être pas le même face aux autres </a:t>
+              <a:t>, le choix ne serait peut-être pas le même face aux autres </a:t>
             </a:r>
             <a:r>
               <a:rPr lang="fr-FR" sz="1800" dirty="0" err="1" smtClean="0"/>
@@ -18933,11 +19803,7 @@
           <a:p>
             <a:r>
               <a:rPr lang="fr-FR" dirty="0" smtClean="0"/>
-              <a:t>Framework Play(Java</a:t>
-            </a:r>
-            <a:r>
-              <a:rPr lang="fr-FR" dirty="0" smtClean="0"/>
-              <a:t>)</a:t>
+              <a:t>Framework Play(Java)</a:t>
             </a:r>
           </a:p>
           <a:p>
@@ -18965,17 +19831,12 @@
               <a:rPr lang="fr-FR" dirty="0" smtClean="0"/>
               <a:t>scala</a:t>
             </a:r>
-            <a:endParaRPr lang="fr-FR" dirty="0" smtClean="0"/>
           </a:p>
           <a:p>
             <a:pPr lvl="1"/>
             <a:r>
               <a:rPr lang="fr-FR" dirty="0" smtClean="0"/>
-              <a:t>Permet de gérer la partie serveur en suivant </a:t>
-            </a:r>
-            <a:r>
-              <a:rPr lang="fr-FR" dirty="0" smtClean="0"/>
-              <a:t>REST</a:t>
+              <a:t>Permet de gérer la partie serveur en suivant REST</a:t>
             </a:r>
           </a:p>
           <a:p>

</xml_diff>